<commit_message>
Code, etc. at end of Tuesday lecture!
</commit_message>
<xml_diff>
--- a/Day to Day/W04_(Feb 2+4)/W04_Memory.pptx
+++ b/Day to Day/W04_(Feb 2+4)/W04_Memory.pptx
@@ -5,17 +5,19 @@
     <p:sldMasterId id="2147483672" r:id="rId1"/>
   </p:sldMasterIdLst>
   <p:notesMasterIdLst>
-    <p:notesMasterId r:id="rId10"/>
+    <p:notesMasterId r:id="rId12"/>
   </p:notesMasterIdLst>
   <p:sldIdLst>
     <p:sldId id="257" r:id="rId2"/>
     <p:sldId id="266" r:id="rId3"/>
-    <p:sldId id="259" r:id="rId4"/>
-    <p:sldId id="261" r:id="rId5"/>
-    <p:sldId id="262" r:id="rId6"/>
-    <p:sldId id="263" r:id="rId7"/>
-    <p:sldId id="264" r:id="rId8"/>
-    <p:sldId id="265" r:id="rId9"/>
+    <p:sldId id="267" r:id="rId4"/>
+    <p:sldId id="268" r:id="rId5"/>
+    <p:sldId id="259" r:id="rId6"/>
+    <p:sldId id="261" r:id="rId7"/>
+    <p:sldId id="262" r:id="rId8"/>
+    <p:sldId id="263" r:id="rId9"/>
+    <p:sldId id="264" r:id="rId10"/>
+    <p:sldId id="265" r:id="rId11"/>
   </p:sldIdLst>
   <p:sldSz cx="12192000" cy="6858000"/>
   <p:notesSz cx="6858000" cy="9144000"/>
@@ -116,7 +118,7 @@
   </p:defaultTextStyle>
   <p:extLst>
     <p:ext uri="{EFAFB233-063F-42B5-8137-9DF3F51BA10A}">
-      <p15:sldGuideLst xmlns="" xmlns:p15="http://schemas.microsoft.com/office/powerpoint/2012/main">
+      <p15:sldGuideLst xmlns:p15="http://schemas.microsoft.com/office/powerpoint/2012/main">
         <p15:guide id="1" orient="horz" pos="2160">
           <p15:clr>
             <a:srgbClr val="A4A3A4"/>
@@ -138,7 +140,7 @@
   <p:cmAuthor id="1" name="Mfeeney" initials="M" lastIdx="1" clrIdx="0">
     <p:extLst>
       <p:ext uri="{19B8F6BF-5375-455C-9EA6-DF929625EA0E}">
-        <p15:presenceInfo xmlns="" xmlns:p15="http://schemas.microsoft.com/office/powerpoint/2012/main" userId="Mfeeney" providerId="None"/>
+        <p15:presenceInfo xmlns:p15="http://schemas.microsoft.com/office/powerpoint/2012/main" userId="Mfeeney" providerId="None"/>
       </p:ext>
     </p:extLst>
   </p:cmAuthor>
@@ -677,7 +679,7 @@
     </p:spTree>
     <p:extLst>
       <p:ext uri="{BB962C8B-B14F-4D97-AF65-F5344CB8AC3E}">
-        <p14:creationId xmlns="" xmlns:p14="http://schemas.microsoft.com/office/powerpoint/2010/main" val="3107681668"/>
+        <p14:creationId xmlns:p14="http://schemas.microsoft.com/office/powerpoint/2010/main" val="3107681668"/>
       </p:ext>
     </p:extLst>
   </p:cSld>
@@ -849,7 +851,7 @@
     </p:spTree>
     <p:extLst>
       <p:ext uri="{BB962C8B-B14F-4D97-AF65-F5344CB8AC3E}">
-        <p14:creationId xmlns="" xmlns:p14="http://schemas.microsoft.com/office/powerpoint/2010/main" val="3647384181"/>
+        <p14:creationId xmlns:p14="http://schemas.microsoft.com/office/powerpoint/2010/main" val="3647384181"/>
       </p:ext>
     </p:extLst>
   </p:cSld>
@@ -1031,7 +1033,7 @@
     </p:spTree>
     <p:extLst>
       <p:ext uri="{BB962C8B-B14F-4D97-AF65-F5344CB8AC3E}">
-        <p14:creationId xmlns="" xmlns:p14="http://schemas.microsoft.com/office/powerpoint/2010/main" val="2792830750"/>
+        <p14:creationId xmlns:p14="http://schemas.microsoft.com/office/powerpoint/2010/main" val="2792830750"/>
       </p:ext>
     </p:extLst>
   </p:cSld>
@@ -1203,7 +1205,7 @@
     </p:spTree>
     <p:extLst>
       <p:ext uri="{BB962C8B-B14F-4D97-AF65-F5344CB8AC3E}">
-        <p14:creationId xmlns="" xmlns:p14="http://schemas.microsoft.com/office/powerpoint/2010/main" val="509184664"/>
+        <p14:creationId xmlns:p14="http://schemas.microsoft.com/office/powerpoint/2010/main" val="509184664"/>
       </p:ext>
     </p:extLst>
   </p:cSld>
@@ -1451,7 +1453,7 @@
     </p:spTree>
     <p:extLst>
       <p:ext uri="{BB962C8B-B14F-4D97-AF65-F5344CB8AC3E}">
-        <p14:creationId xmlns="" xmlns:p14="http://schemas.microsoft.com/office/powerpoint/2010/main" val="892156260"/>
+        <p14:creationId xmlns:p14="http://schemas.microsoft.com/office/powerpoint/2010/main" val="892156260"/>
       </p:ext>
     </p:extLst>
   </p:cSld>
@@ -1685,7 +1687,7 @@
     </p:spTree>
     <p:extLst>
       <p:ext uri="{BB962C8B-B14F-4D97-AF65-F5344CB8AC3E}">
-        <p14:creationId xmlns="" xmlns:p14="http://schemas.microsoft.com/office/powerpoint/2010/main" val="848249251"/>
+        <p14:creationId xmlns:p14="http://schemas.microsoft.com/office/powerpoint/2010/main" val="848249251"/>
       </p:ext>
     </p:extLst>
   </p:cSld>
@@ -2054,7 +2056,7 @@
     </p:spTree>
     <p:extLst>
       <p:ext uri="{BB962C8B-B14F-4D97-AF65-F5344CB8AC3E}">
-        <p14:creationId xmlns="" xmlns:p14="http://schemas.microsoft.com/office/powerpoint/2010/main" val="723057487"/>
+        <p14:creationId xmlns:p14="http://schemas.microsoft.com/office/powerpoint/2010/main" val="723057487"/>
       </p:ext>
     </p:extLst>
   </p:cSld>
@@ -2174,7 +2176,7 @@
     </p:spTree>
     <p:extLst>
       <p:ext uri="{BB962C8B-B14F-4D97-AF65-F5344CB8AC3E}">
-        <p14:creationId xmlns="" xmlns:p14="http://schemas.microsoft.com/office/powerpoint/2010/main" val="958946590"/>
+        <p14:creationId xmlns:p14="http://schemas.microsoft.com/office/powerpoint/2010/main" val="958946590"/>
       </p:ext>
     </p:extLst>
   </p:cSld>
@@ -2271,7 +2273,7 @@
     </p:spTree>
     <p:extLst>
       <p:ext uri="{BB962C8B-B14F-4D97-AF65-F5344CB8AC3E}">
-        <p14:creationId xmlns="" xmlns:p14="http://schemas.microsoft.com/office/powerpoint/2010/main" val="3845104630"/>
+        <p14:creationId xmlns:p14="http://schemas.microsoft.com/office/powerpoint/2010/main" val="3845104630"/>
       </p:ext>
     </p:extLst>
   </p:cSld>
@@ -2550,7 +2552,7 @@
     </p:spTree>
     <p:extLst>
       <p:ext uri="{BB962C8B-B14F-4D97-AF65-F5344CB8AC3E}">
-        <p14:creationId xmlns="" xmlns:p14="http://schemas.microsoft.com/office/powerpoint/2010/main" val="2714987254"/>
+        <p14:creationId xmlns:p14="http://schemas.microsoft.com/office/powerpoint/2010/main" val="2714987254"/>
       </p:ext>
     </p:extLst>
   </p:cSld>
@@ -2809,7 +2811,7 @@
     </p:spTree>
     <p:extLst>
       <p:ext uri="{BB962C8B-B14F-4D97-AF65-F5344CB8AC3E}">
-        <p14:creationId xmlns="" xmlns:p14="http://schemas.microsoft.com/office/powerpoint/2010/main" val="3689369377"/>
+        <p14:creationId xmlns:p14="http://schemas.microsoft.com/office/powerpoint/2010/main" val="3689369377"/>
       </p:ext>
     </p:extLst>
   </p:cSld>
@@ -3060,7 +3062,7 @@
     </p:spTree>
     <p:extLst>
       <p:ext uri="{BB962C8B-B14F-4D97-AF65-F5344CB8AC3E}">
-        <p14:creationId xmlns="" xmlns:p14="http://schemas.microsoft.com/office/powerpoint/2010/main" val="1205886065"/>
+        <p14:creationId xmlns:p14="http://schemas.microsoft.com/office/powerpoint/2010/main" val="1205886065"/>
       </p:ext>
     </p:extLst>
   </p:cSld>
@@ -3383,7 +3385,7 @@
           <p:cNvPr id="2" name="Title 1">
             <a:extLst>
               <a:ext uri="{FF2B5EF4-FFF2-40B4-BE49-F238E27FC236}">
-                <a16:creationId xmlns="" xmlns:a16="http://schemas.microsoft.com/office/drawing/2014/main" id="{BE2B12DA-F42D-461B-B185-057296D98A88}"/>
+                <a16:creationId xmlns:a16="http://schemas.microsoft.com/office/drawing/2014/main" id="{BE2B12DA-F42D-461B-B185-057296D98A88}"/>
               </a:ext>
             </a:extLst>
           </p:cNvPr>
@@ -3405,16 +3407,8 @@
           <a:lstStyle/>
           <a:p>
             <a:r>
-              <a:rPr lang="en-US" dirty="0" smtClean="0"/>
-              <a:t>Week </a:t>
-            </a:r>
-            <a:r>
-              <a:rPr lang="en-US" dirty="0" smtClean="0"/>
-              <a:t>4, </a:t>
-            </a:r>
-            <a:r>
-              <a:rPr lang="en-US" dirty="0" smtClean="0"/>
-              <a:t>Day 2</a:t>
+              <a:rPr lang="en-US" dirty="0"/>
+              <a:t>Week 4, Day 2</a:t>
             </a:r>
             <a:endParaRPr lang="en-CA" dirty="0"/>
           </a:p>
@@ -3425,7 +3419,7 @@
           <p:cNvPr id="3" name="Subtitle 2">
             <a:extLst>
               <a:ext uri="{FF2B5EF4-FFF2-40B4-BE49-F238E27FC236}">
-                <a16:creationId xmlns="" xmlns:a16="http://schemas.microsoft.com/office/drawing/2014/main" id="{563783FE-1566-47A5-9E9E-00D7902C6571}"/>
+                <a16:creationId xmlns:a16="http://schemas.microsoft.com/office/drawing/2014/main" id="{563783FE-1566-47A5-9E9E-00D7902C6571}"/>
               </a:ext>
             </a:extLst>
           </p:cNvPr>
@@ -3450,7 +3444,7 @@
           <a:p>
             <a:pPr algn="l"/>
             <a:r>
-              <a:rPr lang="en-CA" sz="5600" dirty="0" smtClean="0"/>
+              <a:rPr lang="en-CA" sz="5600" dirty="0"/>
               <a:t>Memory allocation:</a:t>
             </a:r>
           </a:p>
@@ -3460,15 +3454,15 @@
               <a:buChar char="•"/>
             </a:pPr>
             <a:r>
-              <a:rPr lang="en-CA" sz="5600" dirty="0" smtClean="0"/>
+              <a:rPr lang="en-CA" sz="5600" dirty="0"/>
               <a:t>In C (</a:t>
             </a:r>
             <a:r>
-              <a:rPr lang="en-CA" sz="5600" u="sng" dirty="0" smtClean="0"/>
+              <a:rPr lang="en-CA" sz="5600" u="sng" dirty="0"/>
               <a:t>don’t</a:t>
             </a:r>
             <a:r>
-              <a:rPr lang="en-CA" sz="5600" dirty="0" smtClean="0"/>
+              <a:rPr lang="en-CA" sz="5600" dirty="0"/>
               <a:t> do this)</a:t>
             </a:r>
           </a:p>
@@ -3478,10 +3472,10 @@
               <a:buChar char="•"/>
             </a:pPr>
             <a:r>
-              <a:rPr lang="en-CA" sz="5600" dirty="0" smtClean="0"/>
+              <a:rPr lang="en-CA" sz="5600" dirty="0"/>
               <a:t>In C++ (do this)</a:t>
             </a:r>
-            <a:endParaRPr lang="en-CA" sz="4400" dirty="0" smtClean="0"/>
+            <a:endParaRPr lang="en-CA" sz="4400" dirty="0"/>
           </a:p>
         </p:txBody>
       </p:sp>
@@ -3548,7 +3542,7 @@
     </p:spTree>
     <p:extLst>
       <p:ext uri="{BB962C8B-B14F-4D97-AF65-F5344CB8AC3E}">
-        <p14:creationId xmlns="" xmlns:p14="http://schemas.microsoft.com/office/powerpoint/2010/main" val="1998408397"/>
+        <p14:creationId xmlns:p14="http://schemas.microsoft.com/office/powerpoint/2010/main" val="1998408397"/>
       </p:ext>
     </p:extLst>
   </p:cSld>
@@ -3556,6 +3550,395 @@
     <a:masterClrMapping/>
   </p:clrMapOvr>
   <p:transition/>
+</p:sld>
+</file>
+
+<file path=ppt/slides/slide10.xml><?xml version="1.0" encoding="utf-8"?>
+<p:sld xmlns:a="http://schemas.openxmlformats.org/drawingml/2006/main" xmlns:r="http://schemas.openxmlformats.org/officeDocument/2006/relationships" xmlns:p="http://schemas.openxmlformats.org/presentationml/2006/main">
+  <p:cSld>
+    <p:spTree>
+      <p:nvGrpSpPr>
+        <p:cNvPr id="1" name=""/>
+        <p:cNvGrpSpPr/>
+        <p:nvPr/>
+      </p:nvGrpSpPr>
+      <p:grpSpPr>
+        <a:xfrm>
+          <a:off x="0" y="0"/>
+          <a:ext cx="0" cy="0"/>
+          <a:chOff x="0" y="0"/>
+          <a:chExt cx="0" cy="0"/>
+        </a:xfrm>
+      </p:grpSpPr>
+      <p:sp>
+        <p:nvSpPr>
+          <p:cNvPr id="2" name="Title 1">
+            <a:extLst>
+              <a:ext uri="{FF2B5EF4-FFF2-40B4-BE49-F238E27FC236}">
+                <a16:creationId xmlns:a16="http://schemas.microsoft.com/office/drawing/2014/main" id="{716D3541-74D8-414C-9798-A3F52A6D7D39}"/>
+              </a:ext>
+            </a:extLst>
+          </p:cNvPr>
+          <p:cNvSpPr>
+            <a:spLocks noGrp="1"/>
+          </p:cNvSpPr>
+          <p:nvPr>
+            <p:ph type="title"/>
+          </p:nvPr>
+        </p:nvSpPr>
+        <p:spPr/>
+        <p:txBody>
+          <a:bodyPr/>
+          <a:lstStyle/>
+          <a:p>
+            <a:r>
+              <a:rPr lang="en-CA" dirty="0" err="1"/>
+              <a:t>Calloc</a:t>
+            </a:r>
+            <a:r>
+              <a:rPr lang="en-CA" dirty="0"/>
+              <a:t>, </a:t>
+            </a:r>
+            <a:r>
+              <a:rPr lang="en-CA" dirty="0" err="1"/>
+              <a:t>malloc</a:t>
+            </a:r>
+            <a:r>
+              <a:rPr lang="en-CA" dirty="0"/>
+              <a:t> and </a:t>
+            </a:r>
+            <a:r>
+              <a:rPr lang="en-CA" dirty="0" err="1"/>
+              <a:t>realloc</a:t>
+            </a:r>
+            <a:r>
+              <a:rPr lang="en-CA" dirty="0"/>
+              <a:t> returns</a:t>
+            </a:r>
+          </a:p>
+        </p:txBody>
+      </p:sp>
+      <p:sp>
+        <p:nvSpPr>
+          <p:cNvPr id="3" name="Content Placeholder 2">
+            <a:extLst>
+              <a:ext uri="{FF2B5EF4-FFF2-40B4-BE49-F238E27FC236}">
+                <a16:creationId xmlns:a16="http://schemas.microsoft.com/office/drawing/2014/main" id="{D21E672E-7B9B-454B-9402-F77554B4EA92}"/>
+              </a:ext>
+            </a:extLst>
+          </p:cNvPr>
+          <p:cNvSpPr>
+            <a:spLocks noGrp="1"/>
+          </p:cNvSpPr>
+          <p:nvPr>
+            <p:ph idx="1"/>
+          </p:nvPr>
+        </p:nvSpPr>
+        <p:spPr/>
+        <p:txBody>
+          <a:bodyPr>
+            <a:normAutofit/>
+          </a:bodyPr>
+          <a:lstStyle/>
+          <a:p>
+            <a:r>
+              <a:rPr lang="en-CA" dirty="0"/>
+              <a:t>The address of the memory block that was allocated if successful (enough memory available)</a:t>
+            </a:r>
+          </a:p>
+          <a:p>
+            <a:pPr marL="0" indent="0">
+              <a:buNone/>
+            </a:pPr>
+            <a:r>
+              <a:rPr lang="en-US" dirty="0"/>
+              <a:t>or</a:t>
+            </a:r>
+            <a:endParaRPr lang="en-CA" dirty="0"/>
+          </a:p>
+          <a:p>
+            <a:r>
+              <a:rPr lang="en-US" dirty="0"/>
+              <a:t>NULL if there was not enough memory to allocate the array</a:t>
+            </a:r>
+            <a:endParaRPr lang="en-CA" dirty="0"/>
+          </a:p>
+        </p:txBody>
+      </p:sp>
+      <p:sp>
+        <p:nvSpPr>
+          <p:cNvPr id="5" name="Rounded Rectangle 4"/>
+          <p:cNvSpPr/>
+          <p:nvPr/>
+        </p:nvSpPr>
+        <p:spPr>
+          <a:xfrm>
+            <a:off x="5581650" y="5748338"/>
+            <a:ext cx="6196013" cy="933450"/>
+          </a:xfrm>
+          <a:prstGeom prst="roundRect">
+            <a:avLst/>
+          </a:prstGeom>
+        </p:spPr>
+        <p:style>
+          <a:lnRef idx="2">
+            <a:schemeClr val="accent1">
+              <a:shade val="50000"/>
+            </a:schemeClr>
+          </a:lnRef>
+          <a:fillRef idx="1">
+            <a:schemeClr val="accent1"/>
+          </a:fillRef>
+          <a:effectRef idx="0">
+            <a:schemeClr val="accent1"/>
+          </a:effectRef>
+          <a:fontRef idx="minor">
+            <a:schemeClr val="lt1"/>
+          </a:fontRef>
+        </p:style>
+        <p:txBody>
+          <a:bodyPr rtlCol="0" anchor="ctr"/>
+          <a:lstStyle/>
+          <a:p>
+            <a:pPr algn="ctr"/>
+            <a:r>
+              <a:rPr lang="en-CA" sz="4400" b="1" dirty="0">
+                <a:solidFill>
+                  <a:srgbClr val="FF0000"/>
+                </a:solidFill>
+              </a:rPr>
+              <a:t>**DON’T USE THESE**</a:t>
+            </a:r>
+          </a:p>
+        </p:txBody>
+      </p:sp>
+    </p:spTree>
+    <p:extLst>
+      <p:ext uri="{BB962C8B-B14F-4D97-AF65-F5344CB8AC3E}">
+        <p14:creationId xmlns:p14="http://schemas.microsoft.com/office/powerpoint/2010/main" val="333943661"/>
+      </p:ext>
+    </p:extLst>
+  </p:cSld>
+  <p:clrMapOvr>
+    <a:masterClrMapping/>
+  </p:clrMapOvr>
+  <p:transition/>
+  <p:timing>
+    <p:tnLst>
+      <p:par>
+        <p:cTn id="1" dur="indefinite" restart="never" nodeType="tmRoot">
+          <p:childTnLst>
+            <p:seq concurrent="1" nextAc="seek">
+              <p:cTn id="2" dur="indefinite" nodeType="mainSeq">
+                <p:childTnLst>
+                  <p:par>
+                    <p:cTn id="3" fill="hold">
+                      <p:stCondLst>
+                        <p:cond delay="indefinite"/>
+                      </p:stCondLst>
+                      <p:childTnLst>
+                        <p:par>
+                          <p:cTn id="4" fill="hold">
+                            <p:stCondLst>
+                              <p:cond delay="0"/>
+                            </p:stCondLst>
+                            <p:childTnLst>
+                              <p:par>
+                                <p:cTn id="5" presetID="10" presetClass="entr" presetSubtype="0" fill="hold" grpId="0" nodeType="clickEffect">
+                                  <p:stCondLst>
+                                    <p:cond delay="0"/>
+                                  </p:stCondLst>
+                                  <p:childTnLst>
+                                    <p:set>
+                                      <p:cBhvr>
+                                        <p:cTn id="6" dur="1" fill="hold">
+                                          <p:stCondLst>
+                                            <p:cond delay="0"/>
+                                          </p:stCondLst>
+                                        </p:cTn>
+                                        <p:tgtEl>
+                                          <p:spTgt spid="3">
+                                            <p:txEl>
+                                              <p:pRg st="0" end="0"/>
+                                            </p:txEl>
+                                          </p:spTgt>
+                                        </p:tgtEl>
+                                        <p:attrNameLst>
+                                          <p:attrName>style.visibility</p:attrName>
+                                        </p:attrNameLst>
+                                      </p:cBhvr>
+                                      <p:to>
+                                        <p:strVal val="visible"/>
+                                      </p:to>
+                                    </p:set>
+                                    <p:animEffect transition="in" filter="fade">
+                                      <p:cBhvr>
+                                        <p:cTn id="7" dur="500"/>
+                                        <p:tgtEl>
+                                          <p:spTgt spid="3">
+                                            <p:txEl>
+                                              <p:pRg st="0" end="0"/>
+                                            </p:txEl>
+                                          </p:spTgt>
+                                        </p:tgtEl>
+                                      </p:cBhvr>
+                                    </p:animEffect>
+                                  </p:childTnLst>
+                                </p:cTn>
+                              </p:par>
+                            </p:childTnLst>
+                          </p:cTn>
+                        </p:par>
+                      </p:childTnLst>
+                    </p:cTn>
+                  </p:par>
+                  <p:par>
+                    <p:cTn id="8" fill="hold">
+                      <p:stCondLst>
+                        <p:cond delay="indefinite"/>
+                      </p:stCondLst>
+                      <p:childTnLst>
+                        <p:par>
+                          <p:cTn id="9" fill="hold">
+                            <p:stCondLst>
+                              <p:cond delay="0"/>
+                            </p:stCondLst>
+                            <p:childTnLst>
+                              <p:par>
+                                <p:cTn id="10" presetID="10" presetClass="entr" presetSubtype="0" fill="hold" grpId="0" nodeType="clickEffect">
+                                  <p:stCondLst>
+                                    <p:cond delay="0"/>
+                                  </p:stCondLst>
+                                  <p:childTnLst>
+                                    <p:set>
+                                      <p:cBhvr>
+                                        <p:cTn id="11" dur="1" fill="hold">
+                                          <p:stCondLst>
+                                            <p:cond delay="0"/>
+                                          </p:stCondLst>
+                                        </p:cTn>
+                                        <p:tgtEl>
+                                          <p:spTgt spid="3">
+                                            <p:txEl>
+                                              <p:pRg st="1" end="1"/>
+                                            </p:txEl>
+                                          </p:spTgt>
+                                        </p:tgtEl>
+                                        <p:attrNameLst>
+                                          <p:attrName>style.visibility</p:attrName>
+                                        </p:attrNameLst>
+                                      </p:cBhvr>
+                                      <p:to>
+                                        <p:strVal val="visible"/>
+                                      </p:to>
+                                    </p:set>
+                                    <p:animEffect transition="in" filter="fade">
+                                      <p:cBhvr>
+                                        <p:cTn id="12" dur="500"/>
+                                        <p:tgtEl>
+                                          <p:spTgt spid="3">
+                                            <p:txEl>
+                                              <p:pRg st="1" end="1"/>
+                                            </p:txEl>
+                                          </p:spTgt>
+                                        </p:tgtEl>
+                                      </p:cBhvr>
+                                    </p:animEffect>
+                                  </p:childTnLst>
+                                </p:cTn>
+                              </p:par>
+                            </p:childTnLst>
+                          </p:cTn>
+                        </p:par>
+                      </p:childTnLst>
+                    </p:cTn>
+                  </p:par>
+                  <p:par>
+                    <p:cTn id="13" fill="hold">
+                      <p:stCondLst>
+                        <p:cond delay="indefinite"/>
+                      </p:stCondLst>
+                      <p:childTnLst>
+                        <p:par>
+                          <p:cTn id="14" fill="hold">
+                            <p:stCondLst>
+                              <p:cond delay="0"/>
+                            </p:stCondLst>
+                            <p:childTnLst>
+                              <p:par>
+                                <p:cTn id="15" presetID="10" presetClass="entr" presetSubtype="0" fill="hold" grpId="0" nodeType="clickEffect">
+                                  <p:stCondLst>
+                                    <p:cond delay="0"/>
+                                  </p:stCondLst>
+                                  <p:childTnLst>
+                                    <p:set>
+                                      <p:cBhvr>
+                                        <p:cTn id="16" dur="1" fill="hold">
+                                          <p:stCondLst>
+                                            <p:cond delay="0"/>
+                                          </p:stCondLst>
+                                        </p:cTn>
+                                        <p:tgtEl>
+                                          <p:spTgt spid="3">
+                                            <p:txEl>
+                                              <p:pRg st="2" end="2"/>
+                                            </p:txEl>
+                                          </p:spTgt>
+                                        </p:tgtEl>
+                                        <p:attrNameLst>
+                                          <p:attrName>style.visibility</p:attrName>
+                                        </p:attrNameLst>
+                                      </p:cBhvr>
+                                      <p:to>
+                                        <p:strVal val="visible"/>
+                                      </p:to>
+                                    </p:set>
+                                    <p:animEffect transition="in" filter="fade">
+                                      <p:cBhvr>
+                                        <p:cTn id="17" dur="500"/>
+                                        <p:tgtEl>
+                                          <p:spTgt spid="3">
+                                            <p:txEl>
+                                              <p:pRg st="2" end="2"/>
+                                            </p:txEl>
+                                          </p:spTgt>
+                                        </p:tgtEl>
+                                      </p:cBhvr>
+                                    </p:animEffect>
+                                  </p:childTnLst>
+                                </p:cTn>
+                              </p:par>
+                            </p:childTnLst>
+                          </p:cTn>
+                        </p:par>
+                      </p:childTnLst>
+                    </p:cTn>
+                  </p:par>
+                </p:childTnLst>
+              </p:cTn>
+              <p:prevCondLst>
+                <p:cond evt="onPrev" delay="0">
+                  <p:tgtEl>
+                    <p:sldTgt/>
+                  </p:tgtEl>
+                </p:cond>
+              </p:prevCondLst>
+              <p:nextCondLst>
+                <p:cond evt="onNext" delay="0">
+                  <p:tgtEl>
+                    <p:sldTgt/>
+                  </p:tgtEl>
+                </p:cond>
+              </p:nextCondLst>
+            </p:seq>
+          </p:childTnLst>
+        </p:cTn>
+      </p:par>
+    </p:tnLst>
+    <p:bldLst>
+      <p:bldP spid="3" grpId="0" build="p"/>
+    </p:bldLst>
+  </p:timing>
 </p:sld>
 </file>
 
@@ -3592,11 +3975,11 @@
           <a:lstStyle/>
           <a:p>
             <a:r>
-              <a:rPr lang="en-CA" dirty="0" smtClean="0"/>
+              <a:rPr lang="en-CA" dirty="0"/>
               <a:t>How C/C++ </a:t>
             </a:r>
             <a:r>
-              <a:rPr lang="en-CA" smtClean="0"/>
+              <a:rPr lang="en-CA"/>
               <a:t>manages memory</a:t>
             </a:r>
             <a:endParaRPr lang="en-US"/>
@@ -3618,7 +4001,19 @@
           <a:bodyPr/>
           <a:lstStyle/>
           <a:p>
-            <a:endParaRPr lang="en-US"/>
+            <a:r>
+              <a:rPr lang="en-US" dirty="0"/>
+              <a:t>The “stack” and the “heap”</a:t>
+            </a:r>
+          </a:p>
+          <a:p>
+            <a:r>
+              <a:rPr lang="en-US" dirty="0"/>
+              <a:t>Know the difference</a:t>
+            </a:r>
+          </a:p>
+          <a:p>
+            <a:endParaRPr lang="en-US" dirty="0"/>
           </a:p>
         </p:txBody>
       </p:sp>
@@ -3649,18 +4044,12 @@
       </p:grpSpPr>
       <p:sp>
         <p:nvSpPr>
-          <p:cNvPr id="2" name="Title 1">
-            <a:extLst>
-              <a:ext uri="{FF2B5EF4-FFF2-40B4-BE49-F238E27FC236}">
-                <a16:creationId xmlns:a16="http://schemas.microsoft.com/office/drawing/2014/main" xmlns="" id="{BE2B12DA-F42D-461B-B185-057296D98A88}"/>
-              </a:ext>
-            </a:extLst>
-          </p:cNvPr>
-          <p:cNvSpPr>
-            <a:spLocks noGrp="1"/>
-          </p:cNvSpPr>
-          <p:nvPr>
-            <p:ph type="ctrTitle"/>
+          <p:cNvPr id="2" name="Title 1"/>
+          <p:cNvSpPr>
+            <a:spLocks noGrp="1"/>
+          </p:cNvSpPr>
+          <p:nvPr>
+            <p:ph type="title"/>
           </p:nvPr>
         </p:nvSpPr>
         <p:spPr/>
@@ -3669,68 +4058,105 @@
           <a:lstStyle/>
           <a:p>
             <a:r>
-              <a:rPr lang="en-US" dirty="0" smtClean="0"/>
-              <a:t>Memory Allocation in </a:t>
-            </a:r>
+              <a:rPr lang="en-CA" dirty="0"/>
+              <a:t>How C/C++ </a:t>
+            </a:r>
+            <a:r>
+              <a:rPr lang="en-CA"/>
+              <a:t>manages memory</a:t>
+            </a:r>
+            <a:endParaRPr lang="en-US"/>
+          </a:p>
+        </p:txBody>
+      </p:sp>
+      <p:sp>
+        <p:nvSpPr>
+          <p:cNvPr id="3" name="Content Placeholder 2"/>
+          <p:cNvSpPr>
+            <a:spLocks noGrp="1"/>
+          </p:cNvSpPr>
+          <p:nvPr>
+            <p:ph idx="1"/>
+          </p:nvPr>
+        </p:nvSpPr>
+        <p:spPr/>
+        <p:txBody>
+          <a:bodyPr/>
+          <a:lstStyle/>
+          <a:p>
             <a:r>
               <a:rPr lang="en-US" dirty="0"/>
-              <a:t>C</a:t>
-            </a:r>
-            <a:endParaRPr lang="en-CA" dirty="0"/>
-          </a:p>
-        </p:txBody>
-      </p:sp>
-      <p:sp>
-        <p:nvSpPr>
-          <p:cNvPr id="3" name="Subtitle 2">
-            <a:extLst>
-              <a:ext uri="{FF2B5EF4-FFF2-40B4-BE49-F238E27FC236}">
-                <a16:creationId xmlns:a16="http://schemas.microsoft.com/office/drawing/2014/main" xmlns="" id="{563783FE-1566-47A5-9E9E-00D7902C6571}"/>
-              </a:ext>
-            </a:extLst>
-          </p:cNvPr>
-          <p:cNvSpPr>
-            <a:spLocks noGrp="1"/>
-          </p:cNvSpPr>
-          <p:nvPr>
-            <p:ph type="subTitle" idx="1"/>
-          </p:nvPr>
-        </p:nvSpPr>
-        <p:spPr/>
-        <p:txBody>
-          <a:bodyPr>
-            <a:normAutofit lnSpcReduction="10000"/>
-          </a:bodyPr>
-          <a:lstStyle/>
-          <a:p>
-            <a:r>
-              <a:rPr lang="en-US" dirty="0" smtClean="0"/>
-              <a:t>INFO-1156</a:t>
-            </a:r>
-          </a:p>
-          <a:p>
-            <a:endParaRPr lang="en-CA" dirty="0" smtClean="0"/>
-          </a:p>
-          <a:p>
-            <a:r>
-              <a:rPr lang="en-CA" sz="4800" dirty="0" smtClean="0"/>
-              <a:t>**DON’T USE THESE**</a:t>
-            </a:r>
-            <a:endParaRPr lang="en-CA" sz="4800" dirty="0"/>
+              <a:t>The “stack”</a:t>
+            </a:r>
+          </a:p>
+          <a:p>
+            <a:pPr lvl="1"/>
+            <a:r>
+              <a:rPr lang="en-US" dirty="0"/>
+              <a:t>Is used to pass and return stuff</a:t>
+            </a:r>
+          </a:p>
+          <a:p>
+            <a:pPr lvl="1"/>
+            <a:r>
+              <a:rPr lang="en-US" dirty="0"/>
+              <a:t>It’s used in anything that doesn’t have “new”</a:t>
+            </a:r>
+          </a:p>
+          <a:p>
+            <a:pPr lvl="1"/>
+            <a:r>
+              <a:rPr lang="en-US" dirty="0"/>
+              <a:t>Limited in size (often 1 Mbyte or smaller)</a:t>
+            </a:r>
+          </a:p>
+          <a:p>
+            <a:pPr lvl="1"/>
+            <a:r>
+              <a:rPr lang="en-US" dirty="0"/>
+              <a:t>“Scope” is usually between the curly braces {} </a:t>
+            </a:r>
+          </a:p>
+          <a:p>
+            <a:pPr lvl="2"/>
+            <a:r>
+              <a:rPr lang="en-US" dirty="0"/>
+              <a:t>If allocated inside, then the “}” deletes the object</a:t>
+            </a:r>
+          </a:p>
+          <a:p>
+            <a:pPr lvl="1"/>
+            <a:r>
+              <a:rPr lang="en-US" dirty="0"/>
+              <a:t>Members are accessed using the dot operator (.Name, .</a:t>
+            </a:r>
+            <a:r>
+              <a:rPr lang="en-US" dirty="0" err="1"/>
+              <a:t>KillHumans</a:t>
+            </a:r>
+            <a:r>
+              <a:rPr lang="en-US" dirty="0"/>
+              <a:t>())</a:t>
+            </a:r>
+          </a:p>
+          <a:p>
+            <a:endParaRPr lang="en-US" dirty="0"/>
+          </a:p>
+          <a:p>
+            <a:endParaRPr lang="en-US" dirty="0"/>
           </a:p>
         </p:txBody>
       </p:sp>
     </p:spTree>
     <p:extLst>
       <p:ext uri="{BB962C8B-B14F-4D97-AF65-F5344CB8AC3E}">
-        <p14:creationId xmlns:p14="http://schemas.microsoft.com/office/powerpoint/2010/main" xmlns="" val="1998408397"/>
+        <p14:creationId xmlns:p14="http://schemas.microsoft.com/office/powerpoint/2010/main" val="2464551904"/>
       </p:ext>
     </p:extLst>
   </p:cSld>
   <p:clrMapOvr>
     <a:masterClrMapping/>
   </p:clrMapOvr>
-  <p:transition/>
 </p:sld>
 </file>
 
@@ -3753,10 +4179,149 @@
       </p:grpSpPr>
       <p:sp>
         <p:nvSpPr>
+          <p:cNvPr id="2" name="Title 1"/>
+          <p:cNvSpPr>
+            <a:spLocks noGrp="1"/>
+          </p:cNvSpPr>
+          <p:nvPr>
+            <p:ph type="title"/>
+          </p:nvPr>
+        </p:nvSpPr>
+        <p:spPr/>
+        <p:txBody>
+          <a:bodyPr/>
+          <a:lstStyle/>
+          <a:p>
+            <a:r>
+              <a:rPr lang="en-CA" dirty="0"/>
+              <a:t>How C/C++ </a:t>
+            </a:r>
+            <a:r>
+              <a:rPr lang="en-CA"/>
+              <a:t>manages memory</a:t>
+            </a:r>
+            <a:endParaRPr lang="en-US"/>
+          </a:p>
+        </p:txBody>
+      </p:sp>
+      <p:sp>
+        <p:nvSpPr>
+          <p:cNvPr id="3" name="Content Placeholder 2"/>
+          <p:cNvSpPr>
+            <a:spLocks noGrp="1"/>
+          </p:cNvSpPr>
+          <p:nvPr>
+            <p:ph idx="1"/>
+          </p:nvPr>
+        </p:nvSpPr>
+        <p:spPr/>
+        <p:txBody>
+          <a:bodyPr/>
+          <a:lstStyle/>
+          <a:p>
+            <a:r>
+              <a:rPr lang="en-US" dirty="0"/>
+              <a:t>The “heap”</a:t>
+            </a:r>
+          </a:p>
+          <a:p>
+            <a:pPr lvl="1"/>
+            <a:r>
+              <a:rPr lang="en-US" dirty="0"/>
+              <a:t>Essentially infinite</a:t>
+            </a:r>
+          </a:p>
+          <a:p>
+            <a:pPr lvl="1"/>
+            <a:r>
+              <a:rPr lang="en-US" dirty="0"/>
+              <a:t>Unmanaged memory</a:t>
+            </a:r>
+          </a:p>
+          <a:p>
+            <a:pPr lvl="2"/>
+            <a:r>
+              <a:rPr lang="en-US" dirty="0"/>
+              <a:t>You create it</a:t>
+            </a:r>
+          </a:p>
+          <a:p>
+            <a:pPr lvl="2"/>
+            <a:r>
+              <a:rPr lang="en-US" dirty="0"/>
+              <a:t>You destroy it</a:t>
+            </a:r>
+          </a:p>
+          <a:p>
+            <a:pPr lvl="1"/>
+            <a:r>
+              <a:rPr lang="en-US" dirty="0"/>
+              <a:t>Unless you delete it, it’s ALWAYS there</a:t>
+            </a:r>
+          </a:p>
+          <a:p>
+            <a:pPr lvl="2"/>
+            <a:r>
+              <a:rPr lang="en-US" dirty="0"/>
+              <a:t>…although you might not be able to get at it (“memory leak”)</a:t>
+            </a:r>
+          </a:p>
+          <a:p>
+            <a:pPr lvl="1"/>
+            <a:r>
+              <a:rPr lang="en-US" dirty="0"/>
+              <a:t>Use “new” and a pointer to </a:t>
+            </a:r>
+            <a:r>
+              <a:rPr lang="en-US"/>
+              <a:t>the object</a:t>
+            </a:r>
+            <a:endParaRPr lang="en-US" dirty="0"/>
+          </a:p>
+          <a:p>
+            <a:endParaRPr lang="en-US" dirty="0"/>
+          </a:p>
+          <a:p>
+            <a:endParaRPr lang="en-US" dirty="0"/>
+          </a:p>
+        </p:txBody>
+      </p:sp>
+    </p:spTree>
+    <p:extLst>
+      <p:ext uri="{BB962C8B-B14F-4D97-AF65-F5344CB8AC3E}">
+        <p14:creationId xmlns:p14="http://schemas.microsoft.com/office/powerpoint/2010/main" val="1104176142"/>
+      </p:ext>
+    </p:extLst>
+  </p:cSld>
+  <p:clrMapOvr>
+    <a:masterClrMapping/>
+  </p:clrMapOvr>
+</p:sld>
+</file>
+
+<file path=ppt/slides/slide5.xml><?xml version="1.0" encoding="utf-8"?>
+<p:sld xmlns:a="http://schemas.openxmlformats.org/drawingml/2006/main" xmlns:r="http://schemas.openxmlformats.org/officeDocument/2006/relationships" xmlns:p="http://schemas.openxmlformats.org/presentationml/2006/main">
+  <p:cSld>
+    <p:spTree>
+      <p:nvGrpSpPr>
+        <p:cNvPr id="1" name=""/>
+        <p:cNvGrpSpPr/>
+        <p:nvPr/>
+      </p:nvGrpSpPr>
+      <p:grpSpPr>
+        <a:xfrm>
+          <a:off x="0" y="0"/>
+          <a:ext cx="0" cy="0"/>
+          <a:chOff x="0" y="0"/>
+          <a:chExt cx="0" cy="0"/>
+        </a:xfrm>
+      </p:grpSpPr>
+      <p:sp>
+        <p:nvSpPr>
           <p:cNvPr id="2" name="Title 1">
             <a:extLst>
               <a:ext uri="{FF2B5EF4-FFF2-40B4-BE49-F238E27FC236}">
-                <a16:creationId xmlns:a16="http://schemas.microsoft.com/office/drawing/2014/main" xmlns="" id="{AF0F90E9-A5BE-45A5-93C9-5CCD6D726BA0}"/>
+                <a16:creationId xmlns:a16="http://schemas.microsoft.com/office/drawing/2014/main" id="{BE2B12DA-F42D-461B-B185-057296D98A88}"/>
               </a:ext>
             </a:extLst>
           </p:cNvPr>
@@ -3764,6 +4329,105 @@
             <a:spLocks noGrp="1"/>
           </p:cNvSpPr>
           <p:nvPr>
+            <p:ph type="ctrTitle"/>
+          </p:nvPr>
+        </p:nvSpPr>
+        <p:spPr/>
+        <p:txBody>
+          <a:bodyPr/>
+          <a:lstStyle/>
+          <a:p>
+            <a:r>
+              <a:rPr lang="en-US" dirty="0"/>
+              <a:t>Memory Allocation in C</a:t>
+            </a:r>
+            <a:endParaRPr lang="en-CA" dirty="0"/>
+          </a:p>
+        </p:txBody>
+      </p:sp>
+      <p:sp>
+        <p:nvSpPr>
+          <p:cNvPr id="3" name="Subtitle 2">
+            <a:extLst>
+              <a:ext uri="{FF2B5EF4-FFF2-40B4-BE49-F238E27FC236}">
+                <a16:creationId xmlns:a16="http://schemas.microsoft.com/office/drawing/2014/main" id="{563783FE-1566-47A5-9E9E-00D7902C6571}"/>
+              </a:ext>
+            </a:extLst>
+          </p:cNvPr>
+          <p:cNvSpPr>
+            <a:spLocks noGrp="1"/>
+          </p:cNvSpPr>
+          <p:nvPr>
+            <p:ph type="subTitle" idx="1"/>
+          </p:nvPr>
+        </p:nvSpPr>
+        <p:spPr/>
+        <p:txBody>
+          <a:bodyPr>
+            <a:normAutofit lnSpcReduction="10000"/>
+          </a:bodyPr>
+          <a:lstStyle/>
+          <a:p>
+            <a:r>
+              <a:rPr lang="en-US" dirty="0"/>
+              <a:t>INFO-1156</a:t>
+            </a:r>
+          </a:p>
+          <a:p>
+            <a:endParaRPr lang="en-CA" dirty="0"/>
+          </a:p>
+          <a:p>
+            <a:r>
+              <a:rPr lang="en-CA" sz="4800" dirty="0"/>
+              <a:t>**DON’T USE THESE**</a:t>
+            </a:r>
+          </a:p>
+        </p:txBody>
+      </p:sp>
+    </p:spTree>
+    <p:extLst>
+      <p:ext uri="{BB962C8B-B14F-4D97-AF65-F5344CB8AC3E}">
+        <p14:creationId xmlns:p14="http://schemas.microsoft.com/office/powerpoint/2010/main" val="1998408397"/>
+      </p:ext>
+    </p:extLst>
+  </p:cSld>
+  <p:clrMapOvr>
+    <a:masterClrMapping/>
+  </p:clrMapOvr>
+  <p:transition/>
+</p:sld>
+</file>
+
+<file path=ppt/slides/slide6.xml><?xml version="1.0" encoding="utf-8"?>
+<p:sld xmlns:a="http://schemas.openxmlformats.org/drawingml/2006/main" xmlns:r="http://schemas.openxmlformats.org/officeDocument/2006/relationships" xmlns:p="http://schemas.openxmlformats.org/presentationml/2006/main">
+  <p:cSld>
+    <p:spTree>
+      <p:nvGrpSpPr>
+        <p:cNvPr id="1" name=""/>
+        <p:cNvGrpSpPr/>
+        <p:nvPr/>
+      </p:nvGrpSpPr>
+      <p:grpSpPr>
+        <a:xfrm>
+          <a:off x="0" y="0"/>
+          <a:ext cx="0" cy="0"/>
+          <a:chOff x="0" y="0"/>
+          <a:chExt cx="0" cy="0"/>
+        </a:xfrm>
+      </p:grpSpPr>
+      <p:sp>
+        <p:nvSpPr>
+          <p:cNvPr id="2" name="Title 1">
+            <a:extLst>
+              <a:ext uri="{FF2B5EF4-FFF2-40B4-BE49-F238E27FC236}">
+                <a16:creationId xmlns:a16="http://schemas.microsoft.com/office/drawing/2014/main" id="{AF0F90E9-A5BE-45A5-93C9-5CCD6D726BA0}"/>
+              </a:ext>
+            </a:extLst>
+          </p:cNvPr>
+          <p:cNvSpPr>
+            <a:spLocks noGrp="1"/>
+          </p:cNvSpPr>
+          <p:nvPr>
             <p:ph type="title"/>
           </p:nvPr>
         </p:nvSpPr>
@@ -3773,10 +4437,9 @@
           <a:lstStyle/>
           <a:p>
             <a:r>
-              <a:rPr lang="en-CA" dirty="0" smtClean="0"/>
+              <a:rPr lang="en-CA" dirty="0"/>
               <a:t>Memory Allocation commands</a:t>
             </a:r>
-            <a:endParaRPr lang="en-CA" dirty="0"/>
           </a:p>
         </p:txBody>
       </p:sp>
@@ -3785,7 +4448,7 @@
           <p:cNvPr id="3" name="Content Placeholder 2">
             <a:extLst>
               <a:ext uri="{FF2B5EF4-FFF2-40B4-BE49-F238E27FC236}">
-                <a16:creationId xmlns:a16="http://schemas.microsoft.com/office/drawing/2014/main" xmlns="" id="{36E8131A-6BB9-48FB-B840-F08F41C6B5E1}"/>
+                <a16:creationId xmlns:a16="http://schemas.microsoft.com/office/drawing/2014/main" id="{36E8131A-6BB9-48FB-B840-F08F41C6B5E1}"/>
               </a:ext>
             </a:extLst>
           </p:cNvPr>
@@ -3884,42 +4547,38 @@
             </a:r>
             <a:r>
               <a:rPr lang="en-US" dirty="0"/>
-              <a:t>.  The function may move the memory block to a new location (whose address is returned by the function</a:t>
-            </a:r>
-            <a:r>
-              <a:rPr lang="en-US" dirty="0" smtClean="0"/>
-              <a:t>).   It must be previously allocated by </a:t>
-            </a:r>
-            <a:r>
-              <a:rPr lang="en-US" dirty="0" err="1" smtClean="0"/>
+              <a:t>.  The function may move the memory block to a new location (whose address is returned by the function).   It must be previously allocated by </a:t>
+            </a:r>
+            <a:r>
+              <a:rPr lang="en-US" dirty="0" err="1"/>
               <a:t>malloc</a:t>
             </a:r>
             <a:r>
-              <a:rPr lang="en-US" dirty="0" smtClean="0"/>
+              <a:rPr lang="en-US" dirty="0"/>
               <a:t>, </a:t>
             </a:r>
             <a:r>
-              <a:rPr lang="en-US" dirty="0" err="1" smtClean="0"/>
+              <a:rPr lang="en-US" dirty="0" err="1"/>
               <a:t>calloc</a:t>
             </a:r>
             <a:r>
-              <a:rPr lang="en-US" dirty="0" smtClean="0"/>
+              <a:rPr lang="en-US" dirty="0"/>
               <a:t> or </a:t>
             </a:r>
             <a:r>
-              <a:rPr lang="en-US" dirty="0" err="1" smtClean="0"/>
+              <a:rPr lang="en-US" dirty="0" err="1"/>
               <a:t>realloc</a:t>
             </a:r>
             <a:r>
-              <a:rPr lang="en-US" dirty="0" smtClean="0"/>
+              <a:rPr lang="en-US" dirty="0"/>
               <a:t> and not yet freed with a call to free or </a:t>
             </a:r>
             <a:r>
-              <a:rPr lang="en-US" dirty="0" err="1" smtClean="0"/>
+              <a:rPr lang="en-US" dirty="0" err="1"/>
               <a:t>realloc</a:t>
             </a:r>
             <a:r>
-              <a:rPr lang="en-US" dirty="0" smtClean="0"/>
+              <a:rPr lang="en-US" dirty="0"/>
               <a:t>.</a:t>
             </a:r>
             <a:endParaRPr lang="en-CA" dirty="0"/>
@@ -3971,33 +4630,20 @@
           <a:p>
             <a:pPr algn="ctr"/>
             <a:r>
-              <a:rPr lang="en-CA" sz="4400" b="1" dirty="0" smtClean="0">
+              <a:rPr lang="en-CA" sz="4400" b="1" dirty="0">
                 <a:solidFill>
                   <a:srgbClr val="FF0000"/>
                 </a:solidFill>
               </a:rPr>
-              <a:t>**DON’T USE THESE</a:t>
-            </a:r>
-            <a:r>
-              <a:rPr lang="en-CA" sz="4400" b="1" dirty="0" smtClean="0">
-                <a:solidFill>
-                  <a:srgbClr val="FF0000"/>
-                </a:solidFill>
-              </a:rPr>
-              <a:t>**</a:t>
-            </a:r>
-            <a:endParaRPr lang="en-CA" sz="4400" b="1" dirty="0" smtClean="0">
-              <a:solidFill>
-                <a:srgbClr val="FF0000"/>
-              </a:solidFill>
-            </a:endParaRPr>
+              <a:t>**DON’T USE THESE**</a:t>
+            </a:r>
           </a:p>
         </p:txBody>
       </p:sp>
     </p:spTree>
     <p:extLst>
       <p:ext uri="{BB962C8B-B14F-4D97-AF65-F5344CB8AC3E}">
-        <p14:creationId xmlns:p14="http://schemas.microsoft.com/office/powerpoint/2010/main" xmlns="" val="354589656"/>
+        <p14:creationId xmlns:p14="http://schemas.microsoft.com/office/powerpoint/2010/main" val="354589656"/>
       </p:ext>
     </p:extLst>
   </p:cSld>
@@ -4346,7 +4992,7 @@
 </p:sld>
 </file>
 
-<file path=ppt/slides/slide5.xml><?xml version="1.0" encoding="utf-8"?>
+<file path=ppt/slides/slide7.xml><?xml version="1.0" encoding="utf-8"?>
 <p:sld xmlns:a="http://schemas.openxmlformats.org/drawingml/2006/main" xmlns:r="http://schemas.openxmlformats.org/officeDocument/2006/relationships" xmlns:p="http://schemas.openxmlformats.org/presentationml/2006/main">
   <p:cSld>
     <p:spTree>
@@ -4368,7 +5014,7 @@
           <p:cNvPr id="2" name="Title 1">
             <a:extLst>
               <a:ext uri="{FF2B5EF4-FFF2-40B4-BE49-F238E27FC236}">
-                <a16:creationId xmlns:a16="http://schemas.microsoft.com/office/drawing/2014/main" xmlns="" id="{381005D9-C353-4F0B-823D-AAD2BF3101E1}"/>
+                <a16:creationId xmlns:a16="http://schemas.microsoft.com/office/drawing/2014/main" id="{381005D9-C353-4F0B-823D-AAD2BF3101E1}"/>
               </a:ext>
             </a:extLst>
           </p:cNvPr>
@@ -4390,7 +5036,7 @@
           <a:lstStyle/>
           <a:p>
             <a:r>
-              <a:rPr lang="en-CA" dirty="0" err="1" smtClean="0"/>
+              <a:rPr lang="en-CA" dirty="0" err="1"/>
               <a:t>calloc</a:t>
             </a:r>
             <a:endParaRPr lang="en-CA" dirty="0"/>
@@ -4406,14 +5052,14 @@
           <p:nvPr>
             <p:extLst>
               <p:ext uri="{D42A27DB-BD31-4B8C-83A1-F6EECF244321}">
-                <p14:modId xmlns:p14="http://schemas.microsoft.com/office/powerpoint/2010/main" xmlns="" val="889894651"/>
+                <p14:modId xmlns:p14="http://schemas.microsoft.com/office/powerpoint/2010/main" val="889894651"/>
               </p:ext>
             </p:extLst>
           </p:nvPr>
         </p:nvGraphicFramePr>
         <p:xfrm>
           <a:off x="135307" y="1251466"/>
-          <a:ext cx="11862147" cy="4480329"/>
+          <a:ext cx="11862147" cy="4409844"/>
         </p:xfrm>
         <a:graphic>
           <a:graphicData uri="http://schemas.openxmlformats.org/drawingml/2006/table">
@@ -4425,14 +5071,14 @@
                 <a:gridCol w="1972796">
                   <a:extLst>
                     <a:ext uri="{9D8B030D-6E8A-4147-A177-3AD203B41FA5}">
-                      <a16:colId xmlns:a16="http://schemas.microsoft.com/office/drawing/2014/main" xmlns="" val="1246606478"/>
+                      <a16:colId xmlns:a16="http://schemas.microsoft.com/office/drawing/2014/main" val="1246606478"/>
                     </a:ext>
                   </a:extLst>
                 </a:gridCol>
                 <a:gridCol w="9889351">
                   <a:extLst>
                     <a:ext uri="{9D8B030D-6E8A-4147-A177-3AD203B41FA5}">
-                      <a16:colId xmlns:a16="http://schemas.microsoft.com/office/drawing/2014/main" xmlns="" val="2955039438"/>
+                      <a16:colId xmlns:a16="http://schemas.microsoft.com/office/drawing/2014/main" val="2955039438"/>
                     </a:ext>
                   </a:extLst>
                 </a:gridCol>
@@ -4504,7 +5150,7 @@
                 </a:tc>
                 <a:extLst>
                   <a:ext uri="{0D108BD9-81ED-4DB2-BD59-A6C34878D82A}">
-                    <a16:rowId xmlns:a16="http://schemas.microsoft.com/office/drawing/2014/main" xmlns="" val="20733786"/>
+                    <a16:rowId xmlns:a16="http://schemas.microsoft.com/office/drawing/2014/main" val="20733786"/>
                   </a:ext>
                 </a:extLst>
               </a:tr>
@@ -4575,7 +5221,7 @@
                 </a:tc>
                 <a:extLst>
                   <a:ext uri="{0D108BD9-81ED-4DB2-BD59-A6C34878D82A}">
-                    <a16:rowId xmlns:a16="http://schemas.microsoft.com/office/drawing/2014/main" xmlns="" val="2973647715"/>
+                    <a16:rowId xmlns:a16="http://schemas.microsoft.com/office/drawing/2014/main" val="2973647715"/>
                   </a:ext>
                 </a:extLst>
               </a:tr>
@@ -4658,7 +5304,7 @@
                 </a:tc>
                 <a:extLst>
                   <a:ext uri="{0D108BD9-81ED-4DB2-BD59-A6C34878D82A}">
-                    <a16:rowId xmlns:a16="http://schemas.microsoft.com/office/drawing/2014/main" xmlns="" val="1286048247"/>
+                    <a16:rowId xmlns:a16="http://schemas.microsoft.com/office/drawing/2014/main" val="1286048247"/>
                   </a:ext>
                 </a:extLst>
               </a:tr>
@@ -4741,7 +5387,7 @@
                 </a:tc>
                 <a:extLst>
                   <a:ext uri="{0D108BD9-81ED-4DB2-BD59-A6C34878D82A}">
-                    <a16:rowId xmlns:a16="http://schemas.microsoft.com/office/drawing/2014/main" xmlns="" val="3105331718"/>
+                    <a16:rowId xmlns:a16="http://schemas.microsoft.com/office/drawing/2014/main" val="3105331718"/>
                   </a:ext>
                 </a:extLst>
               </a:tr>
@@ -4786,33 +5432,20 @@
           <a:p>
             <a:pPr algn="ctr"/>
             <a:r>
-              <a:rPr lang="en-CA" sz="4400" b="1" dirty="0" smtClean="0">
+              <a:rPr lang="en-CA" sz="4400" b="1" dirty="0">
                 <a:solidFill>
                   <a:srgbClr val="FF0000"/>
                 </a:solidFill>
               </a:rPr>
-              <a:t>**DON’T USE THESE</a:t>
-            </a:r>
-            <a:r>
-              <a:rPr lang="en-CA" sz="4400" b="1" dirty="0" smtClean="0">
-                <a:solidFill>
-                  <a:srgbClr val="FF0000"/>
-                </a:solidFill>
-              </a:rPr>
-              <a:t>**</a:t>
-            </a:r>
-            <a:endParaRPr lang="en-CA" sz="4400" b="1" dirty="0" smtClean="0">
-              <a:solidFill>
-                <a:srgbClr val="FF0000"/>
-              </a:solidFill>
-            </a:endParaRPr>
+              <a:t>**DON’T USE THESE**</a:t>
+            </a:r>
           </a:p>
         </p:txBody>
       </p:sp>
     </p:spTree>
     <p:extLst>
       <p:ext uri="{BB962C8B-B14F-4D97-AF65-F5344CB8AC3E}">
-        <p14:creationId xmlns:p14="http://schemas.microsoft.com/office/powerpoint/2010/main" xmlns="" val="119410891"/>
+        <p14:creationId xmlns:p14="http://schemas.microsoft.com/office/powerpoint/2010/main" val="119410891"/>
       </p:ext>
     </p:extLst>
   </p:cSld>
@@ -4820,17 +5453,10 @@
     <a:masterClrMapping/>
   </p:clrMapOvr>
   <p:transition/>
-  <p:timing>
-    <p:tnLst>
-      <p:par>
-        <p:cTn id="1" dur="indefinite" restart="never" nodeType="tmRoot"/>
-      </p:par>
-    </p:tnLst>
-  </p:timing>
 </p:sld>
 </file>
 
-<file path=ppt/slides/slide6.xml><?xml version="1.0" encoding="utf-8"?>
+<file path=ppt/slides/slide8.xml><?xml version="1.0" encoding="utf-8"?>
 <p:sld xmlns:a="http://schemas.openxmlformats.org/drawingml/2006/main" xmlns:r="http://schemas.openxmlformats.org/officeDocument/2006/relationships" xmlns:p="http://schemas.openxmlformats.org/presentationml/2006/main">
   <p:cSld>
     <p:spTree>
@@ -4852,7 +5478,7 @@
           <p:cNvPr id="2" name="Title 1">
             <a:extLst>
               <a:ext uri="{FF2B5EF4-FFF2-40B4-BE49-F238E27FC236}">
-                <a16:creationId xmlns:a16="http://schemas.microsoft.com/office/drawing/2014/main" xmlns="" id="{381005D9-C353-4F0B-823D-AAD2BF3101E1}"/>
+                <a16:creationId xmlns:a16="http://schemas.microsoft.com/office/drawing/2014/main" id="{381005D9-C353-4F0B-823D-AAD2BF3101E1}"/>
               </a:ext>
             </a:extLst>
           </p:cNvPr>
@@ -4874,7 +5500,7 @@
           <a:lstStyle/>
           <a:p>
             <a:r>
-              <a:rPr lang="en-CA" dirty="0" err="1" smtClean="0"/>
+              <a:rPr lang="en-CA" dirty="0" err="1"/>
               <a:t>malloc</a:t>
             </a:r>
             <a:endParaRPr lang="en-CA" dirty="0"/>
@@ -4890,14 +5516,14 @@
           <p:nvPr>
             <p:extLst>
               <p:ext uri="{D42A27DB-BD31-4B8C-83A1-F6EECF244321}">
-                <p14:modId xmlns:p14="http://schemas.microsoft.com/office/powerpoint/2010/main" xmlns="" val="3014915511"/>
+                <p14:modId xmlns:p14="http://schemas.microsoft.com/office/powerpoint/2010/main" val="3014915511"/>
               </p:ext>
             </p:extLst>
           </p:nvPr>
         </p:nvGraphicFramePr>
         <p:xfrm>
           <a:off x="87682" y="1446729"/>
-          <a:ext cx="11862147" cy="3541545"/>
+          <a:ext cx="11862147" cy="3494555"/>
         </p:xfrm>
         <a:graphic>
           <a:graphicData uri="http://schemas.openxmlformats.org/drawingml/2006/table">
@@ -4909,14 +5535,14 @@
                 <a:gridCol w="1972796">
                   <a:extLst>
                     <a:ext uri="{9D8B030D-6E8A-4147-A177-3AD203B41FA5}">
-                      <a16:colId xmlns:a16="http://schemas.microsoft.com/office/drawing/2014/main" xmlns="" val="1246606478"/>
+                      <a16:colId xmlns:a16="http://schemas.microsoft.com/office/drawing/2014/main" val="1246606478"/>
                     </a:ext>
                   </a:extLst>
                 </a:gridCol>
                 <a:gridCol w="9889351">
                   <a:extLst>
                     <a:ext uri="{9D8B030D-6E8A-4147-A177-3AD203B41FA5}">
-                      <a16:colId xmlns:a16="http://schemas.microsoft.com/office/drawing/2014/main" xmlns="" val="2955039438"/>
+                      <a16:colId xmlns:a16="http://schemas.microsoft.com/office/drawing/2014/main" val="2955039438"/>
                     </a:ext>
                   </a:extLst>
                 </a:gridCol>
@@ -4988,7 +5614,7 @@
                 </a:tc>
                 <a:extLst>
                   <a:ext uri="{0D108BD9-81ED-4DB2-BD59-A6C34878D82A}">
-                    <a16:rowId xmlns:a16="http://schemas.microsoft.com/office/drawing/2014/main" xmlns="" val="20733786"/>
+                    <a16:rowId xmlns:a16="http://schemas.microsoft.com/office/drawing/2014/main" val="20733786"/>
                   </a:ext>
                 </a:extLst>
               </a:tr>
@@ -5010,7 +5636,7 @@
                         </a:spcAft>
                       </a:pPr>
                       <a:r>
-                        <a:rPr lang="en-CA" sz="2800" dirty="0" err="1" smtClean="0">
+                        <a:rPr lang="en-CA" sz="2800" dirty="0" err="1">
                           <a:effectLst/>
                         </a:rPr>
                         <a:t>malloc</a:t>
@@ -5051,22 +5677,16 @@
                         <a:rPr lang="en-CA" sz="2800" dirty="0">
                           <a:effectLst/>
                         </a:rPr>
-                        <a:t>Requests a memory block from the heap and </a:t>
+                        <a:t>Requests a memory block from the heap and no</a:t>
                       </a:r>
                       <a:r>
-                        <a:rPr lang="en-CA" sz="2800" dirty="0" smtClean="0">
-                          <a:effectLst/>
-                        </a:rPr>
-                        <a:t>no</a:t>
-                      </a:r>
-                      <a:r>
-                        <a:rPr lang="en-CA" sz="2800" baseline="0" dirty="0" smtClean="0">
+                        <a:rPr lang="en-CA" sz="2800" baseline="0" dirty="0">
                           <a:effectLst/>
                         </a:rPr>
                         <a:t> initialization of memory</a:t>
                       </a:r>
                       <a:r>
-                        <a:rPr lang="en-CA" sz="2800" dirty="0" smtClean="0">
+                        <a:rPr lang="en-CA" sz="2800" dirty="0">
                           <a:effectLst/>
                         </a:rPr>
                         <a:t>.</a:t>
@@ -5083,7 +5703,7 @@
                 </a:tc>
                 <a:extLst>
                   <a:ext uri="{0D108BD9-81ED-4DB2-BD59-A6C34878D82A}">
-                    <a16:rowId xmlns:a16="http://schemas.microsoft.com/office/drawing/2014/main" xmlns="" val="2973647715"/>
+                    <a16:rowId xmlns:a16="http://schemas.microsoft.com/office/drawing/2014/main" val="2973647715"/>
                   </a:ext>
                 </a:extLst>
               </a:tr>
@@ -5149,19 +5769,19 @@
                         </a:spcAft>
                       </a:pPr>
                       <a:r>
-                        <a:rPr lang="en-CA" sz="2800" dirty="0" smtClean="0">
+                        <a:rPr lang="en-CA" sz="2800" dirty="0">
                           <a:effectLst/>
                         </a:rPr>
                         <a:t>The total number of bytes to be</a:t>
                       </a:r>
                       <a:r>
-                        <a:rPr lang="en-CA" sz="2800" baseline="0" dirty="0" smtClean="0">
+                        <a:rPr lang="en-CA" sz="2800" baseline="0" dirty="0">
                           <a:effectLst/>
                         </a:rPr>
                         <a:t> allocated</a:t>
                       </a:r>
                       <a:r>
-                        <a:rPr lang="en-CA" sz="2800" dirty="0" smtClean="0">
+                        <a:rPr lang="en-CA" sz="2800" dirty="0">
                           <a:effectLst/>
                         </a:rPr>
                         <a:t> </a:t>
@@ -5178,7 +5798,7 @@
                 </a:tc>
                 <a:extLst>
                   <a:ext uri="{0D108BD9-81ED-4DB2-BD59-A6C34878D82A}">
-                    <a16:rowId xmlns:a16="http://schemas.microsoft.com/office/drawing/2014/main" xmlns="" val="1286048247"/>
+                    <a16:rowId xmlns:a16="http://schemas.microsoft.com/office/drawing/2014/main" val="1286048247"/>
                   </a:ext>
                 </a:extLst>
               </a:tr>
@@ -5223,33 +5843,20 @@
           <a:p>
             <a:pPr algn="ctr"/>
             <a:r>
-              <a:rPr lang="en-CA" sz="4400" b="1" dirty="0" smtClean="0">
+              <a:rPr lang="en-CA" sz="4400" b="1" dirty="0">
                 <a:solidFill>
                   <a:srgbClr val="FF0000"/>
                 </a:solidFill>
               </a:rPr>
-              <a:t>**DON’T USE THESE</a:t>
-            </a:r>
-            <a:r>
-              <a:rPr lang="en-CA" sz="4400" b="1" dirty="0" smtClean="0">
-                <a:solidFill>
-                  <a:srgbClr val="FF0000"/>
-                </a:solidFill>
-              </a:rPr>
-              <a:t>**</a:t>
-            </a:r>
-            <a:endParaRPr lang="en-CA" sz="4400" b="1" dirty="0" smtClean="0">
-              <a:solidFill>
-                <a:srgbClr val="FF0000"/>
-              </a:solidFill>
-            </a:endParaRPr>
+              <a:t>**DON’T USE THESE**</a:t>
+            </a:r>
           </a:p>
         </p:txBody>
       </p:sp>
     </p:spTree>
     <p:extLst>
       <p:ext uri="{BB962C8B-B14F-4D97-AF65-F5344CB8AC3E}">
-        <p14:creationId xmlns:p14="http://schemas.microsoft.com/office/powerpoint/2010/main" xmlns="" val="3070825751"/>
+        <p14:creationId xmlns:p14="http://schemas.microsoft.com/office/powerpoint/2010/main" val="3070825751"/>
       </p:ext>
     </p:extLst>
   </p:cSld>
@@ -5257,17 +5864,10 @@
     <a:masterClrMapping/>
   </p:clrMapOvr>
   <p:transition/>
-  <p:timing>
-    <p:tnLst>
-      <p:par>
-        <p:cTn id="1" dur="indefinite" restart="never" nodeType="tmRoot"/>
-      </p:par>
-    </p:tnLst>
-  </p:timing>
 </p:sld>
 </file>
 
-<file path=ppt/slides/slide7.xml><?xml version="1.0" encoding="utf-8"?>
+<file path=ppt/slides/slide9.xml><?xml version="1.0" encoding="utf-8"?>
 <p:sld xmlns:a="http://schemas.openxmlformats.org/drawingml/2006/main" xmlns:r="http://schemas.openxmlformats.org/officeDocument/2006/relationships" xmlns:p="http://schemas.openxmlformats.org/presentationml/2006/main">
   <p:cSld>
     <p:spTree>
@@ -5289,7 +5889,7 @@
           <p:cNvPr id="2" name="Title 1">
             <a:extLst>
               <a:ext uri="{FF2B5EF4-FFF2-40B4-BE49-F238E27FC236}">
-                <a16:creationId xmlns:a16="http://schemas.microsoft.com/office/drawing/2014/main" xmlns="" id="{381005D9-C353-4F0B-823D-AAD2BF3101E1}"/>
+                <a16:creationId xmlns:a16="http://schemas.microsoft.com/office/drawing/2014/main" id="{381005D9-C353-4F0B-823D-AAD2BF3101E1}"/>
               </a:ext>
             </a:extLst>
           </p:cNvPr>
@@ -5311,7 +5911,7 @@
           <a:lstStyle/>
           <a:p>
             <a:r>
-              <a:rPr lang="en-CA" dirty="0" err="1" smtClean="0"/>
+              <a:rPr lang="en-CA" dirty="0" err="1"/>
               <a:t>realloc</a:t>
             </a:r>
             <a:endParaRPr lang="en-CA" dirty="0"/>
@@ -5323,7 +5923,7 @@
           <p:cNvPr id="3" name="Content Placeholder 2">
             <a:extLst>
               <a:ext uri="{FF2B5EF4-FFF2-40B4-BE49-F238E27FC236}">
-                <a16:creationId xmlns:a16="http://schemas.microsoft.com/office/drawing/2014/main" xmlns="" id="{C442A515-103F-426B-B128-58373A8832ED}"/>
+                <a16:creationId xmlns:a16="http://schemas.microsoft.com/office/drawing/2014/main" id="{C442A515-103F-426B-B128-58373A8832ED}"/>
               </a:ext>
             </a:extLst>
           </p:cNvPr>
@@ -5354,14 +5954,14 @@
           <p:nvPr>
             <p:extLst>
               <p:ext uri="{D42A27DB-BD31-4B8C-83A1-F6EECF244321}">
-                <p14:modId xmlns:p14="http://schemas.microsoft.com/office/powerpoint/2010/main" xmlns="" val="3780245791"/>
+                <p14:modId xmlns:p14="http://schemas.microsoft.com/office/powerpoint/2010/main" val="3780245791"/>
               </p:ext>
             </p:extLst>
           </p:nvPr>
         </p:nvGraphicFramePr>
         <p:xfrm>
           <a:off x="43841" y="1230504"/>
-          <a:ext cx="11862147" cy="4993475"/>
+          <a:ext cx="11862147" cy="4922990"/>
         </p:xfrm>
         <a:graphic>
           <a:graphicData uri="http://schemas.openxmlformats.org/drawingml/2006/table">
@@ -5373,14 +5973,14 @@
                 <a:gridCol w="1972796">
                   <a:extLst>
                     <a:ext uri="{9D8B030D-6E8A-4147-A177-3AD203B41FA5}">
-                      <a16:colId xmlns:a16="http://schemas.microsoft.com/office/drawing/2014/main" xmlns="" val="1246606478"/>
+                      <a16:colId xmlns:a16="http://schemas.microsoft.com/office/drawing/2014/main" val="1246606478"/>
                     </a:ext>
                   </a:extLst>
                 </a:gridCol>
                 <a:gridCol w="9889351">
                   <a:extLst>
                     <a:ext uri="{9D8B030D-6E8A-4147-A177-3AD203B41FA5}">
-                      <a16:colId xmlns:a16="http://schemas.microsoft.com/office/drawing/2014/main" xmlns="" val="2955039438"/>
+                      <a16:colId xmlns:a16="http://schemas.microsoft.com/office/drawing/2014/main" val="2955039438"/>
                     </a:ext>
                   </a:extLst>
                 </a:gridCol>
@@ -5452,7 +6052,7 @@
                 </a:tc>
                 <a:extLst>
                   <a:ext uri="{0D108BD9-81ED-4DB2-BD59-A6C34878D82A}">
-                    <a16:rowId xmlns:a16="http://schemas.microsoft.com/office/drawing/2014/main" xmlns="" val="20733786"/>
+                    <a16:rowId xmlns:a16="http://schemas.microsoft.com/office/drawing/2014/main" val="20733786"/>
                   </a:ext>
                 </a:extLst>
               </a:tr>
@@ -5474,7 +6074,7 @@
                         </a:spcAft>
                       </a:pPr>
                       <a:r>
-                        <a:rPr lang="en-CA" sz="2800" dirty="0" err="1" smtClean="0">
+                        <a:rPr lang="en-CA" sz="2800" dirty="0" err="1">
                           <a:effectLst/>
                         </a:rPr>
                         <a:t>realloc</a:t>
@@ -5512,73 +6112,73 @@
                         </a:spcAft>
                       </a:pPr>
                       <a:r>
-                        <a:rPr lang="en-CA" sz="2800" dirty="0" smtClean="0">
+                        <a:rPr lang="en-CA" sz="2800" dirty="0">
                           <a:effectLst/>
                         </a:rPr>
                         <a:t>Reallocates</a:t>
                       </a:r>
                       <a:r>
-                        <a:rPr lang="en-CA" sz="2800" baseline="0" dirty="0" smtClean="0">
+                        <a:rPr lang="en-CA" sz="2800" baseline="0" dirty="0">
                           <a:effectLst/>
                         </a:rPr>
                         <a:t> the given area of memory.   It must be </a:t>
                       </a:r>
                       <a:r>
-                        <a:rPr lang="en-CA" sz="2800" baseline="0" dirty="0" err="1" smtClean="0">
+                        <a:rPr lang="en-CA" sz="2800" baseline="0" dirty="0" err="1">
                           <a:effectLst/>
                         </a:rPr>
                         <a:t>preiously</a:t>
                       </a:r>
                       <a:r>
-                        <a:rPr lang="en-CA" sz="2800" baseline="0" dirty="0" smtClean="0">
+                        <a:rPr lang="en-CA" sz="2800" baseline="0" dirty="0">
                           <a:effectLst/>
                         </a:rPr>
                         <a:t> allocated by </a:t>
                       </a:r>
                       <a:r>
-                        <a:rPr lang="en-CA" sz="2800" baseline="0" dirty="0" err="1" smtClean="0">
+                        <a:rPr lang="en-CA" sz="2800" baseline="0" dirty="0" err="1">
                           <a:effectLst/>
                         </a:rPr>
                         <a:t>malloc</a:t>
                       </a:r>
                       <a:r>
-                        <a:rPr lang="en-CA" sz="2800" baseline="0" dirty="0" smtClean="0">
+                        <a:rPr lang="en-CA" sz="2800" baseline="0" dirty="0">
                           <a:effectLst/>
                         </a:rPr>
                         <a:t>, </a:t>
                       </a:r>
                       <a:r>
-                        <a:rPr lang="en-CA" sz="2800" baseline="0" dirty="0" err="1" smtClean="0">
+                        <a:rPr lang="en-CA" sz="2800" baseline="0" dirty="0" err="1">
                           <a:effectLst/>
                         </a:rPr>
                         <a:t>calloc</a:t>
                       </a:r>
                       <a:r>
-                        <a:rPr lang="en-CA" sz="2800" baseline="0" dirty="0" smtClean="0">
+                        <a:rPr lang="en-CA" sz="2800" baseline="0" dirty="0">
                           <a:effectLst/>
                         </a:rPr>
                         <a:t> or </a:t>
                       </a:r>
                       <a:r>
-                        <a:rPr lang="en-CA" sz="2800" baseline="0" dirty="0" err="1" smtClean="0">
+                        <a:rPr lang="en-CA" sz="2800" baseline="0" dirty="0" err="1">
                           <a:effectLst/>
                         </a:rPr>
                         <a:t>realloc</a:t>
                       </a:r>
                       <a:r>
-                        <a:rPr lang="en-CA" sz="2800" baseline="0" dirty="0" smtClean="0">
+                        <a:rPr lang="en-CA" sz="2800" baseline="0" dirty="0">
                           <a:effectLst/>
                         </a:rPr>
                         <a:t> and not yet freed with a call to free or </a:t>
                       </a:r>
                       <a:r>
-                        <a:rPr lang="en-CA" sz="2800" baseline="0" dirty="0" err="1" smtClean="0">
+                        <a:rPr lang="en-CA" sz="2800" baseline="0" dirty="0" err="1">
                           <a:effectLst/>
                         </a:rPr>
                         <a:t>realloc</a:t>
                       </a:r>
                       <a:r>
-                        <a:rPr lang="en-CA" sz="2800" baseline="0" dirty="0" smtClean="0">
+                        <a:rPr lang="en-CA" sz="2800" baseline="0" dirty="0">
                           <a:effectLst/>
                         </a:rPr>
                         <a:t>.</a:t>
@@ -5595,7 +6195,7 @@
                 </a:tc>
                 <a:extLst>
                   <a:ext uri="{0D108BD9-81ED-4DB2-BD59-A6C34878D82A}">
-                    <a16:rowId xmlns:a16="http://schemas.microsoft.com/office/drawing/2014/main" xmlns="" val="2973647715"/>
+                    <a16:rowId xmlns:a16="http://schemas.microsoft.com/office/drawing/2014/main" val="2973647715"/>
                   </a:ext>
                 </a:extLst>
               </a:tr>
@@ -5661,7 +6261,7 @@
                         </a:spcAft>
                       </a:pPr>
                       <a:r>
-                        <a:rPr lang="en-CA" sz="2800" dirty="0" smtClean="0">
+                        <a:rPr lang="en-CA" sz="2800" dirty="0">
                           <a:effectLst/>
                         </a:rPr>
                         <a:t>The pointer to the memory to be reallocated</a:t>
@@ -5678,7 +6278,7 @@
                 </a:tc>
                 <a:extLst>
                   <a:ext uri="{0D108BD9-81ED-4DB2-BD59-A6C34878D82A}">
-                    <a16:rowId xmlns:a16="http://schemas.microsoft.com/office/drawing/2014/main" xmlns="" val="1286048247"/>
+                    <a16:rowId xmlns:a16="http://schemas.microsoft.com/office/drawing/2014/main" val="1286048247"/>
                   </a:ext>
                 </a:extLst>
               </a:tr>
@@ -5706,24 +6306,24 @@
                         <a:defRPr/>
                       </a:pPr>
                       <a:r>
-                        <a:rPr lang="en-CA" sz="2800" dirty="0" smtClean="0">
+                        <a:rPr lang="en-CA" sz="2800" dirty="0">
                           <a:effectLst/>
                         </a:rPr>
                         <a:t>2</a:t>
                       </a:r>
                       <a:r>
-                        <a:rPr lang="en-CA" sz="2800" baseline="30000" dirty="0" smtClean="0">
+                        <a:rPr lang="en-CA" sz="2800" baseline="30000" dirty="0">
                           <a:effectLst/>
                         </a:rPr>
                         <a:t>nd</a:t>
                       </a:r>
                       <a:r>
-                        <a:rPr lang="en-CA" sz="2800" dirty="0" smtClean="0">
+                        <a:rPr lang="en-CA" sz="2800" dirty="0">
                           <a:effectLst/>
                         </a:rPr>
                         <a:t> parameter</a:t>
                       </a:r>
-                      <a:endParaRPr lang="en-CA" sz="2800" dirty="0" smtClean="0">
+                      <a:endParaRPr lang="en-CA" sz="2800" dirty="0">
                         <a:effectLst/>
                         <a:latin typeface="Corbel" panose="020B0503020204020204" pitchFamily="34" charset="0"/>
                         <a:ea typeface="SimSun" panose="02010600030101010101" pitchFamily="2" charset="-122"/>
@@ -5750,7 +6350,7 @@
                         </a:spcAft>
                       </a:pPr>
                       <a:r>
-                        <a:rPr lang="en-US" sz="2800" dirty="0" smtClean="0">
+                        <a:rPr lang="en-US" sz="2800" dirty="0">
                           <a:effectLst/>
                           <a:latin typeface="Corbel" panose="020B0503020204020204" pitchFamily="34" charset="0"/>
                           <a:ea typeface="SimSun" panose="02010600030101010101" pitchFamily="2" charset="-122"/>
@@ -5770,7 +6370,7 @@
                 </a:tc>
                 <a:extLst>
                   <a:ext uri="{0D108BD9-81ED-4DB2-BD59-A6C34878D82A}">
-                    <a16:rowId xmlns:a16="http://schemas.microsoft.com/office/drawing/2014/main" xmlns="" val="2535357646"/>
+                    <a16:rowId xmlns:a16="http://schemas.microsoft.com/office/drawing/2014/main" val="2535357646"/>
                   </a:ext>
                 </a:extLst>
               </a:tr>
@@ -5815,33 +6415,20 @@
           <a:p>
             <a:pPr algn="ctr"/>
             <a:r>
-              <a:rPr lang="en-CA" sz="4400" b="1" dirty="0" smtClean="0">
+              <a:rPr lang="en-CA" sz="4400" b="1" dirty="0">
                 <a:solidFill>
                   <a:srgbClr val="FF0000"/>
                 </a:solidFill>
               </a:rPr>
-              <a:t>**DON’T USE THESE</a:t>
-            </a:r>
-            <a:r>
-              <a:rPr lang="en-CA" sz="4400" b="1" dirty="0" smtClean="0">
-                <a:solidFill>
-                  <a:srgbClr val="FF0000"/>
-                </a:solidFill>
-              </a:rPr>
-              <a:t>**</a:t>
-            </a:r>
-            <a:endParaRPr lang="en-CA" sz="4400" b="1" dirty="0" smtClean="0">
-              <a:solidFill>
-                <a:srgbClr val="FF0000"/>
-              </a:solidFill>
-            </a:endParaRPr>
+              <a:t>**DON’T USE THESE**</a:t>
+            </a:r>
           </a:p>
         </p:txBody>
       </p:sp>
     </p:spTree>
     <p:extLst>
       <p:ext uri="{BB962C8B-B14F-4D97-AF65-F5344CB8AC3E}">
-        <p14:creationId xmlns:p14="http://schemas.microsoft.com/office/powerpoint/2010/main" xmlns="" val="3384426822"/>
+        <p14:creationId xmlns:p14="http://schemas.microsoft.com/office/powerpoint/2010/main" val="3384426822"/>
       </p:ext>
     </p:extLst>
   </p:cSld>
@@ -5909,413 +6496,6 @@
                                           <p:spTgt spid="3">
                                             <p:txEl>
                                               <p:pRg st="0" end="0"/>
-                                            </p:txEl>
-                                          </p:spTgt>
-                                        </p:tgtEl>
-                                      </p:cBhvr>
-                                    </p:animEffect>
-                                  </p:childTnLst>
-                                </p:cTn>
-                              </p:par>
-                            </p:childTnLst>
-                          </p:cTn>
-                        </p:par>
-                      </p:childTnLst>
-                    </p:cTn>
-                  </p:par>
-                </p:childTnLst>
-              </p:cTn>
-              <p:prevCondLst>
-                <p:cond evt="onPrev" delay="0">
-                  <p:tgtEl>
-                    <p:sldTgt/>
-                  </p:tgtEl>
-                </p:cond>
-              </p:prevCondLst>
-              <p:nextCondLst>
-                <p:cond evt="onNext" delay="0">
-                  <p:tgtEl>
-                    <p:sldTgt/>
-                  </p:tgtEl>
-                </p:cond>
-              </p:nextCondLst>
-            </p:seq>
-          </p:childTnLst>
-        </p:cTn>
-      </p:par>
-    </p:tnLst>
-    <p:bldLst>
-      <p:bldP spid="3" grpId="0" build="p"/>
-    </p:bldLst>
-  </p:timing>
-</p:sld>
-</file>
-
-<file path=ppt/slides/slide8.xml><?xml version="1.0" encoding="utf-8"?>
-<p:sld xmlns:a="http://schemas.openxmlformats.org/drawingml/2006/main" xmlns:r="http://schemas.openxmlformats.org/officeDocument/2006/relationships" xmlns:p="http://schemas.openxmlformats.org/presentationml/2006/main">
-  <p:cSld>
-    <p:spTree>
-      <p:nvGrpSpPr>
-        <p:cNvPr id="1" name=""/>
-        <p:cNvGrpSpPr/>
-        <p:nvPr/>
-      </p:nvGrpSpPr>
-      <p:grpSpPr>
-        <a:xfrm>
-          <a:off x="0" y="0"/>
-          <a:ext cx="0" cy="0"/>
-          <a:chOff x="0" y="0"/>
-          <a:chExt cx="0" cy="0"/>
-        </a:xfrm>
-      </p:grpSpPr>
-      <p:sp>
-        <p:nvSpPr>
-          <p:cNvPr id="2" name="Title 1">
-            <a:extLst>
-              <a:ext uri="{FF2B5EF4-FFF2-40B4-BE49-F238E27FC236}">
-                <a16:creationId xmlns:a16="http://schemas.microsoft.com/office/drawing/2014/main" xmlns="" id="{716D3541-74D8-414C-9798-A3F52A6D7D39}"/>
-              </a:ext>
-            </a:extLst>
-          </p:cNvPr>
-          <p:cNvSpPr>
-            <a:spLocks noGrp="1"/>
-          </p:cNvSpPr>
-          <p:nvPr>
-            <p:ph type="title"/>
-          </p:nvPr>
-        </p:nvSpPr>
-        <p:spPr/>
-        <p:txBody>
-          <a:bodyPr/>
-          <a:lstStyle/>
-          <a:p>
-            <a:r>
-              <a:rPr lang="en-CA" dirty="0" err="1" smtClean="0"/>
-              <a:t>Calloc</a:t>
-            </a:r>
-            <a:r>
-              <a:rPr lang="en-CA" dirty="0"/>
-              <a:t>,</a:t>
-            </a:r>
-            <a:r>
-              <a:rPr lang="en-CA" dirty="0" smtClean="0"/>
-              <a:t> </a:t>
-            </a:r>
-            <a:r>
-              <a:rPr lang="en-CA" dirty="0" err="1" smtClean="0"/>
-              <a:t>malloc</a:t>
-            </a:r>
-            <a:r>
-              <a:rPr lang="en-CA" dirty="0" smtClean="0"/>
-              <a:t> and </a:t>
-            </a:r>
-            <a:r>
-              <a:rPr lang="en-CA" dirty="0" err="1" smtClean="0"/>
-              <a:t>realloc</a:t>
-            </a:r>
-            <a:r>
-              <a:rPr lang="en-CA" dirty="0" smtClean="0"/>
-              <a:t> returns</a:t>
-            </a:r>
-            <a:endParaRPr lang="en-CA" dirty="0"/>
-          </a:p>
-        </p:txBody>
-      </p:sp>
-      <p:sp>
-        <p:nvSpPr>
-          <p:cNvPr id="3" name="Content Placeholder 2">
-            <a:extLst>
-              <a:ext uri="{FF2B5EF4-FFF2-40B4-BE49-F238E27FC236}">
-                <a16:creationId xmlns:a16="http://schemas.microsoft.com/office/drawing/2014/main" xmlns="" id="{D21E672E-7B9B-454B-9402-F77554B4EA92}"/>
-              </a:ext>
-            </a:extLst>
-          </p:cNvPr>
-          <p:cNvSpPr>
-            <a:spLocks noGrp="1"/>
-          </p:cNvSpPr>
-          <p:nvPr>
-            <p:ph idx="1"/>
-          </p:nvPr>
-        </p:nvSpPr>
-        <p:spPr/>
-        <p:txBody>
-          <a:bodyPr>
-            <a:normAutofit/>
-          </a:bodyPr>
-          <a:lstStyle/>
-          <a:p>
-            <a:r>
-              <a:rPr lang="en-CA" dirty="0" smtClean="0"/>
-              <a:t>The address of the memory block that was allocated if successful (enough memory available)</a:t>
-            </a:r>
-          </a:p>
-          <a:p>
-            <a:pPr marL="0" indent="0">
-              <a:buNone/>
-            </a:pPr>
-            <a:r>
-              <a:rPr lang="en-US" dirty="0" smtClean="0"/>
-              <a:t>or</a:t>
-            </a:r>
-            <a:endParaRPr lang="en-CA" dirty="0" smtClean="0"/>
-          </a:p>
-          <a:p>
-            <a:r>
-              <a:rPr lang="en-US" dirty="0" smtClean="0"/>
-              <a:t>NULL if there was not enough memory to allocate the array</a:t>
-            </a:r>
-            <a:endParaRPr lang="en-CA" dirty="0"/>
-          </a:p>
-        </p:txBody>
-      </p:sp>
-      <p:sp>
-        <p:nvSpPr>
-          <p:cNvPr id="5" name="Rounded Rectangle 4"/>
-          <p:cNvSpPr/>
-          <p:nvPr/>
-        </p:nvSpPr>
-        <p:spPr>
-          <a:xfrm>
-            <a:off x="5581650" y="5748338"/>
-            <a:ext cx="6196013" cy="933450"/>
-          </a:xfrm>
-          <a:prstGeom prst="roundRect">
-            <a:avLst/>
-          </a:prstGeom>
-        </p:spPr>
-        <p:style>
-          <a:lnRef idx="2">
-            <a:schemeClr val="accent1">
-              <a:shade val="50000"/>
-            </a:schemeClr>
-          </a:lnRef>
-          <a:fillRef idx="1">
-            <a:schemeClr val="accent1"/>
-          </a:fillRef>
-          <a:effectRef idx="0">
-            <a:schemeClr val="accent1"/>
-          </a:effectRef>
-          <a:fontRef idx="minor">
-            <a:schemeClr val="lt1"/>
-          </a:fontRef>
-        </p:style>
-        <p:txBody>
-          <a:bodyPr rtlCol="0" anchor="ctr"/>
-          <a:lstStyle/>
-          <a:p>
-            <a:pPr algn="ctr"/>
-            <a:r>
-              <a:rPr lang="en-CA" sz="4400" b="1" dirty="0" smtClean="0">
-                <a:solidFill>
-                  <a:srgbClr val="FF0000"/>
-                </a:solidFill>
-              </a:rPr>
-              <a:t>**DON’T USE THESE</a:t>
-            </a:r>
-            <a:r>
-              <a:rPr lang="en-CA" sz="4400" b="1" dirty="0" smtClean="0">
-                <a:solidFill>
-                  <a:srgbClr val="FF0000"/>
-                </a:solidFill>
-              </a:rPr>
-              <a:t>**</a:t>
-            </a:r>
-            <a:endParaRPr lang="en-CA" sz="4400" b="1" dirty="0" smtClean="0">
-              <a:solidFill>
-                <a:srgbClr val="FF0000"/>
-              </a:solidFill>
-            </a:endParaRPr>
-          </a:p>
-        </p:txBody>
-      </p:sp>
-    </p:spTree>
-    <p:extLst>
-      <p:ext uri="{BB962C8B-B14F-4D97-AF65-F5344CB8AC3E}">
-        <p14:creationId xmlns:p14="http://schemas.microsoft.com/office/powerpoint/2010/main" xmlns="" val="333943661"/>
-      </p:ext>
-    </p:extLst>
-  </p:cSld>
-  <p:clrMapOvr>
-    <a:masterClrMapping/>
-  </p:clrMapOvr>
-  <p:transition/>
-  <p:timing>
-    <p:tnLst>
-      <p:par>
-        <p:cTn id="1" dur="indefinite" restart="never" nodeType="tmRoot">
-          <p:childTnLst>
-            <p:seq concurrent="1" nextAc="seek">
-              <p:cTn id="2" dur="indefinite" nodeType="mainSeq">
-                <p:childTnLst>
-                  <p:par>
-                    <p:cTn id="3" fill="hold">
-                      <p:stCondLst>
-                        <p:cond delay="indefinite"/>
-                      </p:stCondLst>
-                      <p:childTnLst>
-                        <p:par>
-                          <p:cTn id="4" fill="hold">
-                            <p:stCondLst>
-                              <p:cond delay="0"/>
-                            </p:stCondLst>
-                            <p:childTnLst>
-                              <p:par>
-                                <p:cTn id="5" presetID="10" presetClass="entr" presetSubtype="0" fill="hold" grpId="0" nodeType="clickEffect">
-                                  <p:stCondLst>
-                                    <p:cond delay="0"/>
-                                  </p:stCondLst>
-                                  <p:childTnLst>
-                                    <p:set>
-                                      <p:cBhvr>
-                                        <p:cTn id="6" dur="1" fill="hold">
-                                          <p:stCondLst>
-                                            <p:cond delay="0"/>
-                                          </p:stCondLst>
-                                        </p:cTn>
-                                        <p:tgtEl>
-                                          <p:spTgt spid="3">
-                                            <p:txEl>
-                                              <p:pRg st="0" end="0"/>
-                                            </p:txEl>
-                                          </p:spTgt>
-                                        </p:tgtEl>
-                                        <p:attrNameLst>
-                                          <p:attrName>style.visibility</p:attrName>
-                                        </p:attrNameLst>
-                                      </p:cBhvr>
-                                      <p:to>
-                                        <p:strVal val="visible"/>
-                                      </p:to>
-                                    </p:set>
-                                    <p:animEffect transition="in" filter="fade">
-                                      <p:cBhvr>
-                                        <p:cTn id="7" dur="500"/>
-                                        <p:tgtEl>
-                                          <p:spTgt spid="3">
-                                            <p:txEl>
-                                              <p:pRg st="0" end="0"/>
-                                            </p:txEl>
-                                          </p:spTgt>
-                                        </p:tgtEl>
-                                      </p:cBhvr>
-                                    </p:animEffect>
-                                  </p:childTnLst>
-                                </p:cTn>
-                              </p:par>
-                            </p:childTnLst>
-                          </p:cTn>
-                        </p:par>
-                      </p:childTnLst>
-                    </p:cTn>
-                  </p:par>
-                  <p:par>
-                    <p:cTn id="8" fill="hold">
-                      <p:stCondLst>
-                        <p:cond delay="indefinite"/>
-                      </p:stCondLst>
-                      <p:childTnLst>
-                        <p:par>
-                          <p:cTn id="9" fill="hold">
-                            <p:stCondLst>
-                              <p:cond delay="0"/>
-                            </p:stCondLst>
-                            <p:childTnLst>
-                              <p:par>
-                                <p:cTn id="10" presetID="10" presetClass="entr" presetSubtype="0" fill="hold" grpId="0" nodeType="clickEffect">
-                                  <p:stCondLst>
-                                    <p:cond delay="0"/>
-                                  </p:stCondLst>
-                                  <p:childTnLst>
-                                    <p:set>
-                                      <p:cBhvr>
-                                        <p:cTn id="11" dur="1" fill="hold">
-                                          <p:stCondLst>
-                                            <p:cond delay="0"/>
-                                          </p:stCondLst>
-                                        </p:cTn>
-                                        <p:tgtEl>
-                                          <p:spTgt spid="3">
-                                            <p:txEl>
-                                              <p:pRg st="1" end="1"/>
-                                            </p:txEl>
-                                          </p:spTgt>
-                                        </p:tgtEl>
-                                        <p:attrNameLst>
-                                          <p:attrName>style.visibility</p:attrName>
-                                        </p:attrNameLst>
-                                      </p:cBhvr>
-                                      <p:to>
-                                        <p:strVal val="visible"/>
-                                      </p:to>
-                                    </p:set>
-                                    <p:animEffect transition="in" filter="fade">
-                                      <p:cBhvr>
-                                        <p:cTn id="12" dur="500"/>
-                                        <p:tgtEl>
-                                          <p:spTgt spid="3">
-                                            <p:txEl>
-                                              <p:pRg st="1" end="1"/>
-                                            </p:txEl>
-                                          </p:spTgt>
-                                        </p:tgtEl>
-                                      </p:cBhvr>
-                                    </p:animEffect>
-                                  </p:childTnLst>
-                                </p:cTn>
-                              </p:par>
-                            </p:childTnLst>
-                          </p:cTn>
-                        </p:par>
-                      </p:childTnLst>
-                    </p:cTn>
-                  </p:par>
-                  <p:par>
-                    <p:cTn id="13" fill="hold">
-                      <p:stCondLst>
-                        <p:cond delay="indefinite"/>
-                      </p:stCondLst>
-                      <p:childTnLst>
-                        <p:par>
-                          <p:cTn id="14" fill="hold">
-                            <p:stCondLst>
-                              <p:cond delay="0"/>
-                            </p:stCondLst>
-                            <p:childTnLst>
-                              <p:par>
-                                <p:cTn id="15" presetID="10" presetClass="entr" presetSubtype="0" fill="hold" grpId="0" nodeType="clickEffect">
-                                  <p:stCondLst>
-                                    <p:cond delay="0"/>
-                                  </p:stCondLst>
-                                  <p:childTnLst>
-                                    <p:set>
-                                      <p:cBhvr>
-                                        <p:cTn id="16" dur="1" fill="hold">
-                                          <p:stCondLst>
-                                            <p:cond delay="0"/>
-                                          </p:stCondLst>
-                                        </p:cTn>
-                                        <p:tgtEl>
-                                          <p:spTgt spid="3">
-                                            <p:txEl>
-                                              <p:pRg st="2" end="2"/>
-                                            </p:txEl>
-                                          </p:spTgt>
-                                        </p:tgtEl>
-                                        <p:attrNameLst>
-                                          <p:attrName>style.visibility</p:attrName>
-                                        </p:attrNameLst>
-                                      </p:cBhvr>
-                                      <p:to>
-                                        <p:strVal val="visible"/>
-                                      </p:to>
-                                    </p:set>
-                                    <p:animEffect transition="in" filter="fade">
-                                      <p:cBhvr>
-                                        <p:cTn id="17" dur="500"/>
-                                        <p:tgtEl>
-                                          <p:spTgt spid="3">
-                                            <p:txEl>
-                                              <p:pRg st="2" end="2"/>
                                             </p:txEl>
                                           </p:spTgt>
                                         </p:tgtEl>
@@ -6613,7 +6793,7 @@
   <a:extraClrSchemeLst/>
   <a:extLst>
     <a:ext uri="{05A4C25C-085E-4340-85A3-A5531E510DB2}">
-      <thm15:themeFamily xmlns="" xmlns:thm15="http://schemas.microsoft.com/office/thememl/2012/main" name="Office Theme" id="{62F939B6-93AF-4DB8-9C6B-D6C7DFDC589F}" vid="{4F46216B-77A9-411A-B9D3-5023FCB70208}"/>
+      <thm15:themeFamily xmlns:thm15="http://schemas.microsoft.com/office/thememl/2012/main" name="Office Theme" id="{62F939B6-93AF-4DB8-9C6B-D6C7DFDC589F}" vid="{4F46216B-77A9-411A-B9D3-5023FCB70208}"/>
     </a:ext>
   </a:extLst>
 </a:theme>

</xml_diff>